<commit_message>
Flutter Blog List (My First Flutter Project)
Flutter Blog List (My First Flutter Project)
</commit_message>
<xml_diff>
--- a/Flutter/PPT/Slide.pptx
+++ b/Flutter/PPT/Slide.pptx
@@ -5,7 +5,7 @@
     <p:sldMasterId id="2147483648" r:id="rId1"/>
   </p:sldMasterIdLst>
   <p:notesMasterIdLst>
-    <p:notesMasterId r:id="rId40"/>
+    <p:notesMasterId r:id="rId41"/>
   </p:notesMasterIdLst>
   <p:sldIdLst>
     <p:sldId id="256" r:id="rId2"/>
@@ -46,6 +46,7 @@
     <p:sldId id="306" r:id="rId37"/>
     <p:sldId id="307" r:id="rId38"/>
     <p:sldId id="308" r:id="rId39"/>
+    <p:sldId id="309" r:id="rId40"/>
   </p:sldIdLst>
   <p:sldSz cx="9144000" cy="5143500" type="screen16x9"/>
   <p:notesSz cx="6858000" cy="9144000"/>
@@ -245,7 +246,7 @@
           <a:p>
             <a:fld id="{38EBF754-CDC4-4762-B81C-FDFA88BC1D35}" type="datetimeFigureOut">
               <a:rPr lang="en-US" smtClean="0"/>
-              <a:t>Thu</a:t>
+              <a:t>11/19/2022</a:t>
             </a:fld>
             <a:endParaRPr lang="en-US"/>
           </a:p>
@@ -848,6 +849,90 @@
 </p:notes>
 </file>
 
+<file path=ppt/notesSlides/notesSlide13.xml><?xml version="1.0" encoding="utf-8"?>
+<p:notes xmlns:a="http://schemas.openxmlformats.org/drawingml/2006/main" xmlns:r="http://schemas.openxmlformats.org/officeDocument/2006/relationships" xmlns:p="http://schemas.openxmlformats.org/presentationml/2006/main">
+  <p:cSld>
+    <p:spTree>
+      <p:nvGrpSpPr>
+        <p:cNvPr id="1" name=""/>
+        <p:cNvGrpSpPr/>
+        <p:nvPr/>
+      </p:nvGrpSpPr>
+      <p:grpSpPr>
+        <a:xfrm>
+          <a:off x="0" y="0"/>
+          <a:ext cx="0" cy="0"/>
+          <a:chOff x="0" y="0"/>
+          <a:chExt cx="0" cy="0"/>
+        </a:xfrm>
+      </p:grpSpPr>
+      <p:sp>
+        <p:nvSpPr>
+          <p:cNvPr id="2" name="Slide Image Placeholder 1"/>
+          <p:cNvSpPr>
+            <a:spLocks noGrp="1" noRot="1" noChangeAspect="1"/>
+          </p:cNvSpPr>
+          <p:nvPr>
+            <p:ph type="sldImg"/>
+          </p:nvPr>
+        </p:nvSpPr>
+        <p:spPr/>
+      </p:sp>
+      <p:sp>
+        <p:nvSpPr>
+          <p:cNvPr id="3" name="Notes Placeholder 2"/>
+          <p:cNvSpPr>
+            <a:spLocks noGrp="1"/>
+          </p:cNvSpPr>
+          <p:nvPr>
+            <p:ph type="body" idx="1"/>
+          </p:nvPr>
+        </p:nvSpPr>
+        <p:spPr/>
+        <p:txBody>
+          <a:bodyPr/>
+          <a:lstStyle/>
+          <a:p>
+            <a:endParaRPr lang="en-US" dirty="0"/>
+          </a:p>
+        </p:txBody>
+      </p:sp>
+      <p:sp>
+        <p:nvSpPr>
+          <p:cNvPr id="4" name="Slide Number Placeholder 3"/>
+          <p:cNvSpPr>
+            <a:spLocks noGrp="1"/>
+          </p:cNvSpPr>
+          <p:nvPr>
+            <p:ph type="sldNum" sz="quarter" idx="5"/>
+          </p:nvPr>
+        </p:nvSpPr>
+        <p:spPr/>
+        <p:txBody>
+          <a:bodyPr/>
+          <a:lstStyle/>
+          <a:p>
+            <a:fld id="{B3A417B2-A29D-48B9-A4A7-A6FB997901AB}" type="slidenum">
+              <a:rPr lang="en-US" smtClean="0"/>
+              <a:t>39</a:t>
+            </a:fld>
+            <a:endParaRPr lang="en-US"/>
+          </a:p>
+        </p:txBody>
+      </p:sp>
+    </p:spTree>
+    <p:extLst>
+      <p:ext uri="{BB962C8B-B14F-4D97-AF65-F5344CB8AC3E}">
+        <p14:creationId xmlns:p14="http://schemas.microsoft.com/office/powerpoint/2010/main" val="3035479178"/>
+      </p:ext>
+    </p:extLst>
+  </p:cSld>
+  <p:clrMapOvr>
+    <a:masterClrMapping/>
+  </p:clrMapOvr>
+</p:notes>
+</file>
+
 <file path=ppt/notesSlides/notesSlide2.xml><?xml version="1.0" encoding="utf-8"?>
 <p:notes xmlns:a="http://schemas.openxmlformats.org/drawingml/2006/main" xmlns:r="http://schemas.openxmlformats.org/officeDocument/2006/relationships" xmlns:p="http://schemas.openxmlformats.org/presentationml/2006/main">
   <p:cSld>
@@ -1700,7 +1785,7 @@
             <a:fld id="{1D8BD707-D9CF-40AE-B4C6-C98DA3205C09}" type="datetimeFigureOut">
               <a:rPr lang="en-US" smtClean="0"/>
               <a:pPr/>
-              <a:t>Thu</a:t>
+              <a:t>11/19/2022</a:t>
             </a:fld>
             <a:endParaRPr lang="en-US"/>
           </a:p>
@@ -1865,7 +1950,7 @@
             <a:fld id="{1D8BD707-D9CF-40AE-B4C6-C98DA3205C09}" type="datetimeFigureOut">
               <a:rPr lang="en-US" smtClean="0"/>
               <a:pPr/>
-              <a:t>Thu</a:t>
+              <a:t>11/19/2022</a:t>
             </a:fld>
             <a:endParaRPr lang="en-US"/>
           </a:p>
@@ -2040,7 +2125,7 @@
             <a:fld id="{1D8BD707-D9CF-40AE-B4C6-C98DA3205C09}" type="datetimeFigureOut">
               <a:rPr lang="en-US" smtClean="0"/>
               <a:pPr/>
-              <a:t>Thu</a:t>
+              <a:t>11/19/2022</a:t>
             </a:fld>
             <a:endParaRPr lang="en-US"/>
           </a:p>
@@ -2205,7 +2290,7 @@
             <a:fld id="{1D8BD707-D9CF-40AE-B4C6-C98DA3205C09}" type="datetimeFigureOut">
               <a:rPr lang="en-US" smtClean="0"/>
               <a:pPr/>
-              <a:t>Thu</a:t>
+              <a:t>11/19/2022</a:t>
             </a:fld>
             <a:endParaRPr lang="en-US"/>
           </a:p>
@@ -2447,7 +2532,7 @@
             <a:fld id="{1D8BD707-D9CF-40AE-B4C6-C98DA3205C09}" type="datetimeFigureOut">
               <a:rPr lang="en-US" smtClean="0"/>
               <a:pPr/>
-              <a:t>Thu</a:t>
+              <a:t>11/19/2022</a:t>
             </a:fld>
             <a:endParaRPr lang="en-US"/>
           </a:p>
@@ -2729,7 +2814,7 @@
             <a:fld id="{1D8BD707-D9CF-40AE-B4C6-C98DA3205C09}" type="datetimeFigureOut">
               <a:rPr lang="en-US" smtClean="0"/>
               <a:pPr/>
-              <a:t>Thu</a:t>
+              <a:t>11/19/2022</a:t>
             </a:fld>
             <a:endParaRPr lang="en-US"/>
           </a:p>
@@ -3145,7 +3230,7 @@
             <a:fld id="{1D8BD707-D9CF-40AE-B4C6-C98DA3205C09}" type="datetimeFigureOut">
               <a:rPr lang="en-US" smtClean="0"/>
               <a:pPr/>
-              <a:t>Thu</a:t>
+              <a:t>11/19/2022</a:t>
             </a:fld>
             <a:endParaRPr lang="en-US"/>
           </a:p>
@@ -3259,7 +3344,7 @@
             <a:fld id="{1D8BD707-D9CF-40AE-B4C6-C98DA3205C09}" type="datetimeFigureOut">
               <a:rPr lang="en-US" smtClean="0"/>
               <a:pPr/>
-              <a:t>Thu</a:t>
+              <a:t>11/19/2022</a:t>
             </a:fld>
             <a:endParaRPr lang="en-US"/>
           </a:p>
@@ -3351,7 +3436,7 @@
             <a:fld id="{1D8BD707-D9CF-40AE-B4C6-C98DA3205C09}" type="datetimeFigureOut">
               <a:rPr lang="en-US" smtClean="0"/>
               <a:pPr/>
-              <a:t>Thu</a:t>
+              <a:t>11/19/2022</a:t>
             </a:fld>
             <a:endParaRPr lang="en-US"/>
           </a:p>
@@ -3623,7 +3708,7 @@
             <a:fld id="{1D8BD707-D9CF-40AE-B4C6-C98DA3205C09}" type="datetimeFigureOut">
               <a:rPr lang="en-US" smtClean="0"/>
               <a:pPr/>
-              <a:t>Thu</a:t>
+              <a:t>11/19/2022</a:t>
             </a:fld>
             <a:endParaRPr lang="en-US"/>
           </a:p>
@@ -3872,7 +3957,7 @@
             <a:fld id="{1D8BD707-D9CF-40AE-B4C6-C98DA3205C09}" type="datetimeFigureOut">
               <a:rPr lang="en-US" smtClean="0"/>
               <a:pPr/>
-              <a:t>Thu</a:t>
+              <a:t>11/19/2022</a:t>
             </a:fld>
             <a:endParaRPr lang="en-US"/>
           </a:p>
@@ -4089,7 +4174,7 @@
             <a:fld id="{1D8BD707-D9CF-40AE-B4C6-C98DA3205C09}" type="datetimeFigureOut">
               <a:rPr lang="en-US" smtClean="0"/>
               <a:pPr/>
-              <a:t>Thu</a:t>
+              <a:t>11/19/2022</a:t>
             </a:fld>
             <a:endParaRPr lang="en-US"/>
           </a:p>
@@ -4573,7 +4658,7 @@
           <p:cNvPr id="4" name="Picture 3">
             <a:extLst>
               <a:ext uri="{FF2B5EF4-FFF2-40B4-BE49-F238E27FC236}">
-                <a16:creationId xmlns:a16="http://schemas.microsoft.com/office/drawing/2014/main" id="{F717AD2B-8CBD-D15F-2B82-C04AB4107C06}"/>
+                <a16:creationId xmlns="" xmlns:a16="http://schemas.microsoft.com/office/drawing/2014/main" id="{F717AD2B-8CBD-D15F-2B82-C04AB4107C06}"/>
               </a:ext>
             </a:extLst>
           </p:cNvPr>
@@ -4603,7 +4688,7 @@
           <p:cNvPr id="7" name="TextBox 6">
             <a:extLst>
               <a:ext uri="{FF2B5EF4-FFF2-40B4-BE49-F238E27FC236}">
-                <a16:creationId xmlns:a16="http://schemas.microsoft.com/office/drawing/2014/main" id="{D5175723-71CB-419F-22D4-E782F927EABB}"/>
+                <a16:creationId xmlns="" xmlns:a16="http://schemas.microsoft.com/office/drawing/2014/main" id="{D5175723-71CB-419F-22D4-E782F927EABB}"/>
               </a:ext>
             </a:extLst>
           </p:cNvPr>
@@ -5117,7 +5202,7 @@
           <p:cNvPr id="4" name="Picture 3">
             <a:extLst>
               <a:ext uri="{FF2B5EF4-FFF2-40B4-BE49-F238E27FC236}">
-                <a16:creationId xmlns:a16="http://schemas.microsoft.com/office/drawing/2014/main" id="{F717AD2B-8CBD-D15F-2B82-C04AB4107C06}"/>
+                <a16:creationId xmlns="" xmlns:a16="http://schemas.microsoft.com/office/drawing/2014/main" id="{F717AD2B-8CBD-D15F-2B82-C04AB4107C06}"/>
               </a:ext>
             </a:extLst>
           </p:cNvPr>
@@ -5147,7 +5232,7 @@
           <p:cNvPr id="5" name="TextBox 4">
             <a:extLst>
               <a:ext uri="{FF2B5EF4-FFF2-40B4-BE49-F238E27FC236}">
-                <a16:creationId xmlns:a16="http://schemas.microsoft.com/office/drawing/2014/main" id="{E0376106-D0E3-FDF1-30DD-702D60BB3347}"/>
+                <a16:creationId xmlns="" xmlns:a16="http://schemas.microsoft.com/office/drawing/2014/main" id="{E0376106-D0E3-FDF1-30DD-702D60BB3347}"/>
               </a:ext>
             </a:extLst>
           </p:cNvPr>
@@ -5606,7 +5691,7 @@
           <p:cNvPr id="4" name="Picture 3">
             <a:extLst>
               <a:ext uri="{FF2B5EF4-FFF2-40B4-BE49-F238E27FC236}">
-                <a16:creationId xmlns:a16="http://schemas.microsoft.com/office/drawing/2014/main" id="{F717AD2B-8CBD-D15F-2B82-C04AB4107C06}"/>
+                <a16:creationId xmlns="" xmlns:a16="http://schemas.microsoft.com/office/drawing/2014/main" id="{F717AD2B-8CBD-D15F-2B82-C04AB4107C06}"/>
               </a:ext>
             </a:extLst>
           </p:cNvPr>
@@ -5636,7 +5721,7 @@
           <p:cNvPr id="5" name="TextBox 4">
             <a:extLst>
               <a:ext uri="{FF2B5EF4-FFF2-40B4-BE49-F238E27FC236}">
-                <a16:creationId xmlns:a16="http://schemas.microsoft.com/office/drawing/2014/main" id="{E0376106-D0E3-FDF1-30DD-702D60BB3347}"/>
+                <a16:creationId xmlns="" xmlns:a16="http://schemas.microsoft.com/office/drawing/2014/main" id="{E0376106-D0E3-FDF1-30DD-702D60BB3347}"/>
               </a:ext>
             </a:extLst>
           </p:cNvPr>
@@ -6151,7 +6236,7 @@
           <p:cNvPr id="4" name="Picture 3">
             <a:extLst>
               <a:ext uri="{FF2B5EF4-FFF2-40B4-BE49-F238E27FC236}">
-                <a16:creationId xmlns:a16="http://schemas.microsoft.com/office/drawing/2014/main" id="{F717AD2B-8CBD-D15F-2B82-C04AB4107C06}"/>
+                <a16:creationId xmlns="" xmlns:a16="http://schemas.microsoft.com/office/drawing/2014/main" id="{F717AD2B-8CBD-D15F-2B82-C04AB4107C06}"/>
               </a:ext>
             </a:extLst>
           </p:cNvPr>
@@ -6181,7 +6266,7 @@
           <p:cNvPr id="5" name="TextBox 4">
             <a:extLst>
               <a:ext uri="{FF2B5EF4-FFF2-40B4-BE49-F238E27FC236}">
-                <a16:creationId xmlns:a16="http://schemas.microsoft.com/office/drawing/2014/main" id="{E0376106-D0E3-FDF1-30DD-702D60BB3347}"/>
+                <a16:creationId xmlns="" xmlns:a16="http://schemas.microsoft.com/office/drawing/2014/main" id="{E0376106-D0E3-FDF1-30DD-702D60BB3347}"/>
               </a:ext>
             </a:extLst>
           </p:cNvPr>
@@ -6780,7 +6865,7 @@
           <p:cNvPr id="4" name="Picture 3">
             <a:extLst>
               <a:ext uri="{FF2B5EF4-FFF2-40B4-BE49-F238E27FC236}">
-                <a16:creationId xmlns:a16="http://schemas.microsoft.com/office/drawing/2014/main" id="{F717AD2B-8CBD-D15F-2B82-C04AB4107C06}"/>
+                <a16:creationId xmlns="" xmlns:a16="http://schemas.microsoft.com/office/drawing/2014/main" id="{F717AD2B-8CBD-D15F-2B82-C04AB4107C06}"/>
               </a:ext>
             </a:extLst>
           </p:cNvPr>
@@ -6810,7 +6895,7 @@
           <p:cNvPr id="5" name="TextBox 4">
             <a:extLst>
               <a:ext uri="{FF2B5EF4-FFF2-40B4-BE49-F238E27FC236}">
-                <a16:creationId xmlns:a16="http://schemas.microsoft.com/office/drawing/2014/main" id="{E0376106-D0E3-FDF1-30DD-702D60BB3347}"/>
+                <a16:creationId xmlns="" xmlns:a16="http://schemas.microsoft.com/office/drawing/2014/main" id="{E0376106-D0E3-FDF1-30DD-702D60BB3347}"/>
               </a:ext>
             </a:extLst>
           </p:cNvPr>
@@ -7192,7 +7277,7 @@
           <p:cNvPr id="12" name="Picture 11">
             <a:extLst>
               <a:ext uri="{FF2B5EF4-FFF2-40B4-BE49-F238E27FC236}">
-                <a16:creationId xmlns:a16="http://schemas.microsoft.com/office/drawing/2014/main" id="{6246B09D-98C1-98DD-BB33-9626C6B27FE7}"/>
+                <a16:creationId xmlns="" xmlns:a16="http://schemas.microsoft.com/office/drawing/2014/main" id="{6246B09D-98C1-98DD-BB33-9626C6B27FE7}"/>
               </a:ext>
             </a:extLst>
           </p:cNvPr>
@@ -7233,7 +7318,7 @@
           <p:cNvPr id="14" name="Picture 13">
             <a:extLst>
               <a:ext uri="{FF2B5EF4-FFF2-40B4-BE49-F238E27FC236}">
-                <a16:creationId xmlns:a16="http://schemas.microsoft.com/office/drawing/2014/main" id="{851B748B-AAE4-A6FD-F0F9-7B9AE2CF6768}"/>
+                <a16:creationId xmlns="" xmlns:a16="http://schemas.microsoft.com/office/drawing/2014/main" id="{851B748B-AAE4-A6FD-F0F9-7B9AE2CF6768}"/>
               </a:ext>
             </a:extLst>
           </p:cNvPr>
@@ -7274,7 +7359,7 @@
           <p:cNvPr id="16" name="Picture 15">
             <a:extLst>
               <a:ext uri="{FF2B5EF4-FFF2-40B4-BE49-F238E27FC236}">
-                <a16:creationId xmlns:a16="http://schemas.microsoft.com/office/drawing/2014/main" id="{7C5719E1-FDB3-4006-5534-3DD54FC66EE3}"/>
+                <a16:creationId xmlns="" xmlns:a16="http://schemas.microsoft.com/office/drawing/2014/main" id="{7C5719E1-FDB3-4006-5534-3DD54FC66EE3}"/>
               </a:ext>
             </a:extLst>
           </p:cNvPr>
@@ -7315,7 +7400,7 @@
           <p:cNvPr id="18" name="Picture 17">
             <a:extLst>
               <a:ext uri="{FF2B5EF4-FFF2-40B4-BE49-F238E27FC236}">
-                <a16:creationId xmlns:a16="http://schemas.microsoft.com/office/drawing/2014/main" id="{C035E3BA-7831-8D3B-31DF-F238D800AEE2}"/>
+                <a16:creationId xmlns="" xmlns:a16="http://schemas.microsoft.com/office/drawing/2014/main" id="{C035E3BA-7831-8D3B-31DF-F238D800AEE2}"/>
               </a:ext>
             </a:extLst>
           </p:cNvPr>
@@ -7356,7 +7441,7 @@
           <p:cNvPr id="20" name="Picture 19">
             <a:extLst>
               <a:ext uri="{FF2B5EF4-FFF2-40B4-BE49-F238E27FC236}">
-                <a16:creationId xmlns:a16="http://schemas.microsoft.com/office/drawing/2014/main" id="{EB3FF892-51CD-C245-3C4D-F8880565EFBA}"/>
+                <a16:creationId xmlns="" xmlns:a16="http://schemas.microsoft.com/office/drawing/2014/main" id="{EB3FF892-51CD-C245-3C4D-F8880565EFBA}"/>
               </a:ext>
             </a:extLst>
           </p:cNvPr>
@@ -7770,7 +7855,7 @@
           <p:cNvPr id="6" name="Picture 5">
             <a:extLst>
               <a:ext uri="{FF2B5EF4-FFF2-40B4-BE49-F238E27FC236}">
-                <a16:creationId xmlns:a16="http://schemas.microsoft.com/office/drawing/2014/main" id="{5708D172-EB47-5B8C-A647-330A4FE1D937}"/>
+                <a16:creationId xmlns="" xmlns:a16="http://schemas.microsoft.com/office/drawing/2014/main" id="{5708D172-EB47-5B8C-A647-330A4FE1D937}"/>
               </a:ext>
             </a:extLst>
           </p:cNvPr>
@@ -7806,7 +7891,7 @@
           <p:cNvPr id="8" name="Picture 7">
             <a:extLst>
               <a:ext uri="{FF2B5EF4-FFF2-40B4-BE49-F238E27FC236}">
-                <a16:creationId xmlns:a16="http://schemas.microsoft.com/office/drawing/2014/main" id="{5069D928-ECC4-A54F-1464-4482D5ED954A}"/>
+                <a16:creationId xmlns="" xmlns:a16="http://schemas.microsoft.com/office/drawing/2014/main" id="{5069D928-ECC4-A54F-1464-4482D5ED954A}"/>
               </a:ext>
             </a:extLst>
           </p:cNvPr>
@@ -7920,7 +8005,7 @@
           <p:cNvPr id="2" name="TextBox 1">
             <a:extLst>
               <a:ext uri="{FF2B5EF4-FFF2-40B4-BE49-F238E27FC236}">
-                <a16:creationId xmlns:a16="http://schemas.microsoft.com/office/drawing/2014/main" id="{33336A0E-48F4-D7C9-BA40-DCEE411852B3}"/>
+                <a16:creationId xmlns="" xmlns:a16="http://schemas.microsoft.com/office/drawing/2014/main" id="{33336A0E-48F4-D7C9-BA40-DCEE411852B3}"/>
               </a:ext>
             </a:extLst>
           </p:cNvPr>
@@ -7955,7 +8040,7 @@
           <p:cNvPr id="7" name="TextBox 6">
             <a:extLst>
               <a:ext uri="{FF2B5EF4-FFF2-40B4-BE49-F238E27FC236}">
-                <a16:creationId xmlns:a16="http://schemas.microsoft.com/office/drawing/2014/main" id="{2E1A672D-122B-387B-5CC2-E216A5F7F2DB}"/>
+                <a16:creationId xmlns="" xmlns:a16="http://schemas.microsoft.com/office/drawing/2014/main" id="{2E1A672D-122B-387B-5CC2-E216A5F7F2DB}"/>
               </a:ext>
             </a:extLst>
           </p:cNvPr>
@@ -8002,7 +8087,7 @@
           <p:cNvPr id="9" name="TextBox 8">
             <a:extLst>
               <a:ext uri="{FF2B5EF4-FFF2-40B4-BE49-F238E27FC236}">
-                <a16:creationId xmlns:a16="http://schemas.microsoft.com/office/drawing/2014/main" id="{08C73998-4E41-B4AA-C27B-3062D8A3E62F}"/>
+                <a16:creationId xmlns="" xmlns:a16="http://schemas.microsoft.com/office/drawing/2014/main" id="{08C73998-4E41-B4AA-C27B-3062D8A3E62F}"/>
               </a:ext>
             </a:extLst>
           </p:cNvPr>
@@ -8057,7 +8142,7 @@
           <p:cNvPr id="10" name="TextBox 9">
             <a:extLst>
               <a:ext uri="{FF2B5EF4-FFF2-40B4-BE49-F238E27FC236}">
-                <a16:creationId xmlns:a16="http://schemas.microsoft.com/office/drawing/2014/main" id="{CB4A2AB9-ACD2-632E-C300-D664C5B27276}"/>
+                <a16:creationId xmlns="" xmlns:a16="http://schemas.microsoft.com/office/drawing/2014/main" id="{CB4A2AB9-ACD2-632E-C300-D664C5B27276}"/>
               </a:ext>
             </a:extLst>
           </p:cNvPr>
@@ -8120,7 +8205,7 @@
           <p:cNvPr id="11" name="TextBox 10">
             <a:extLst>
               <a:ext uri="{FF2B5EF4-FFF2-40B4-BE49-F238E27FC236}">
-                <a16:creationId xmlns:a16="http://schemas.microsoft.com/office/drawing/2014/main" id="{5B370E78-DD83-4D33-7AB8-D6427C836F2E}"/>
+                <a16:creationId xmlns="" xmlns:a16="http://schemas.microsoft.com/office/drawing/2014/main" id="{5B370E78-DD83-4D33-7AB8-D6427C836F2E}"/>
               </a:ext>
             </a:extLst>
           </p:cNvPr>
@@ -8167,7 +8252,7 @@
           <p:cNvPr id="12" name="TextBox 11">
             <a:extLst>
               <a:ext uri="{FF2B5EF4-FFF2-40B4-BE49-F238E27FC236}">
-                <a16:creationId xmlns:a16="http://schemas.microsoft.com/office/drawing/2014/main" id="{150A7265-F50D-D7AA-B93D-24535B4ADA11}"/>
+                <a16:creationId xmlns="" xmlns:a16="http://schemas.microsoft.com/office/drawing/2014/main" id="{150A7265-F50D-D7AA-B93D-24535B4ADA11}"/>
               </a:ext>
             </a:extLst>
           </p:cNvPr>
@@ -8648,7 +8733,7 @@
           <p:cNvPr id="2" name="TextBox 1">
             <a:extLst>
               <a:ext uri="{FF2B5EF4-FFF2-40B4-BE49-F238E27FC236}">
-                <a16:creationId xmlns:a16="http://schemas.microsoft.com/office/drawing/2014/main" id="{33336A0E-48F4-D7C9-BA40-DCEE411852B3}"/>
+                <a16:creationId xmlns="" xmlns:a16="http://schemas.microsoft.com/office/drawing/2014/main" id="{33336A0E-48F4-D7C9-BA40-DCEE411852B3}"/>
               </a:ext>
             </a:extLst>
           </p:cNvPr>
@@ -8683,7 +8768,7 @@
           <p:cNvPr id="8" name="Picture 7">
             <a:extLst>
               <a:ext uri="{FF2B5EF4-FFF2-40B4-BE49-F238E27FC236}">
-                <a16:creationId xmlns:a16="http://schemas.microsoft.com/office/drawing/2014/main" id="{92F96B93-507C-18C0-DE88-7CF1B4BB794C}"/>
+                <a16:creationId xmlns="" xmlns:a16="http://schemas.microsoft.com/office/drawing/2014/main" id="{92F96B93-507C-18C0-DE88-7CF1B4BB794C}"/>
               </a:ext>
             </a:extLst>
           </p:cNvPr>
@@ -8956,7 +9041,7 @@
           <p:cNvPr id="2" name="TextBox 1">
             <a:extLst>
               <a:ext uri="{FF2B5EF4-FFF2-40B4-BE49-F238E27FC236}">
-                <a16:creationId xmlns:a16="http://schemas.microsoft.com/office/drawing/2014/main" id="{33336A0E-48F4-D7C9-BA40-DCEE411852B3}"/>
+                <a16:creationId xmlns="" xmlns:a16="http://schemas.microsoft.com/office/drawing/2014/main" id="{33336A0E-48F4-D7C9-BA40-DCEE411852B3}"/>
               </a:ext>
             </a:extLst>
           </p:cNvPr>
@@ -8995,7 +9080,7 @@
           <p:cNvPr id="7" name="TextBox 6">
             <a:extLst>
               <a:ext uri="{FF2B5EF4-FFF2-40B4-BE49-F238E27FC236}">
-                <a16:creationId xmlns:a16="http://schemas.microsoft.com/office/drawing/2014/main" id="{D7D063EC-DC90-CF1F-D867-4FB476E2290A}"/>
+                <a16:creationId xmlns="" xmlns:a16="http://schemas.microsoft.com/office/drawing/2014/main" id="{D7D063EC-DC90-CF1F-D867-4FB476E2290A}"/>
               </a:ext>
             </a:extLst>
           </p:cNvPr>
@@ -9145,7 +9230,7 @@
           <p:cNvPr id="10" name="Picture 9">
             <a:extLst>
               <a:ext uri="{FF2B5EF4-FFF2-40B4-BE49-F238E27FC236}">
-                <a16:creationId xmlns:a16="http://schemas.microsoft.com/office/drawing/2014/main" id="{022A4660-53DF-4858-97A0-334CA1733DC0}"/>
+                <a16:creationId xmlns="" xmlns:a16="http://schemas.microsoft.com/office/drawing/2014/main" id="{022A4660-53DF-4858-97A0-334CA1733DC0}"/>
               </a:ext>
             </a:extLst>
           </p:cNvPr>
@@ -9930,7 +10015,7 @@
           <p:cNvPr id="7" name="TextBox 6">
             <a:extLst>
               <a:ext uri="{FF2B5EF4-FFF2-40B4-BE49-F238E27FC236}">
-                <a16:creationId xmlns:a16="http://schemas.microsoft.com/office/drawing/2014/main" id="{D7D063EC-DC90-CF1F-D867-4FB476E2290A}"/>
+                <a16:creationId xmlns="" xmlns:a16="http://schemas.microsoft.com/office/drawing/2014/main" id="{D7D063EC-DC90-CF1F-D867-4FB476E2290A}"/>
               </a:ext>
             </a:extLst>
           </p:cNvPr>
@@ -9985,7 +10070,7 @@
           <p:cNvPr id="5" name="Picture 4">
             <a:extLst>
               <a:ext uri="{FF2B5EF4-FFF2-40B4-BE49-F238E27FC236}">
-                <a16:creationId xmlns:a16="http://schemas.microsoft.com/office/drawing/2014/main" id="{60376970-5DA4-BACA-103C-32835A7A07E7}"/>
+                <a16:creationId xmlns="" xmlns:a16="http://schemas.microsoft.com/office/drawing/2014/main" id="{60376970-5DA4-BACA-103C-32835A7A07E7}"/>
               </a:ext>
             </a:extLst>
           </p:cNvPr>
@@ -10251,7 +10336,7 @@
           <p:cNvPr id="7" name="TextBox 6">
             <a:extLst>
               <a:ext uri="{FF2B5EF4-FFF2-40B4-BE49-F238E27FC236}">
-                <a16:creationId xmlns:a16="http://schemas.microsoft.com/office/drawing/2014/main" id="{D7D063EC-DC90-CF1F-D867-4FB476E2290A}"/>
+                <a16:creationId xmlns="" xmlns:a16="http://schemas.microsoft.com/office/drawing/2014/main" id="{D7D063EC-DC90-CF1F-D867-4FB476E2290A}"/>
               </a:ext>
             </a:extLst>
           </p:cNvPr>
@@ -10319,7 +10404,7 @@
           <p:cNvPr id="4" name="Picture 3">
             <a:extLst>
               <a:ext uri="{FF2B5EF4-FFF2-40B4-BE49-F238E27FC236}">
-                <a16:creationId xmlns:a16="http://schemas.microsoft.com/office/drawing/2014/main" id="{D06DCC9F-8B06-83BC-FF3E-BAC5AB2064AB}"/>
+                <a16:creationId xmlns="" xmlns:a16="http://schemas.microsoft.com/office/drawing/2014/main" id="{D06DCC9F-8B06-83BC-FF3E-BAC5AB2064AB}"/>
               </a:ext>
             </a:extLst>
           </p:cNvPr>
@@ -10645,7 +10730,7 @@
           <p:cNvPr id="5" name="Picture 4">
             <a:extLst>
               <a:ext uri="{FF2B5EF4-FFF2-40B4-BE49-F238E27FC236}">
-                <a16:creationId xmlns:a16="http://schemas.microsoft.com/office/drawing/2014/main" id="{97C2BD1D-F1E8-021D-1A45-75E1ED111CA6}"/>
+                <a16:creationId xmlns="" xmlns:a16="http://schemas.microsoft.com/office/drawing/2014/main" id="{97C2BD1D-F1E8-021D-1A45-75E1ED111CA6}"/>
               </a:ext>
             </a:extLst>
           </p:cNvPr>
@@ -10759,7 +10844,7 @@
           <p:cNvPr id="4" name="Picture 3">
             <a:extLst>
               <a:ext uri="{FF2B5EF4-FFF2-40B4-BE49-F238E27FC236}">
-                <a16:creationId xmlns:a16="http://schemas.microsoft.com/office/drawing/2014/main" id="{79A97B1A-1DC6-EF75-866C-9D7AF6C2CB63}"/>
+                <a16:creationId xmlns="" xmlns:a16="http://schemas.microsoft.com/office/drawing/2014/main" id="{79A97B1A-1DC6-EF75-866C-9D7AF6C2CB63}"/>
               </a:ext>
             </a:extLst>
           </p:cNvPr>
@@ -10872,7 +10957,7 @@
           <p:cNvPr id="5" name="Picture 4">
             <a:extLst>
               <a:ext uri="{FF2B5EF4-FFF2-40B4-BE49-F238E27FC236}">
-                <a16:creationId xmlns:a16="http://schemas.microsoft.com/office/drawing/2014/main" id="{F7C982F1-4AB9-554F-2F70-41D2A04AF6C3}"/>
+                <a16:creationId xmlns="" xmlns:a16="http://schemas.microsoft.com/office/drawing/2014/main" id="{F7C982F1-4AB9-554F-2F70-41D2A04AF6C3}"/>
               </a:ext>
             </a:extLst>
           </p:cNvPr>
@@ -10980,7 +11065,7 @@
           <p:cNvPr id="4" name="Picture 3">
             <a:extLst>
               <a:ext uri="{FF2B5EF4-FFF2-40B4-BE49-F238E27FC236}">
-                <a16:creationId xmlns:a16="http://schemas.microsoft.com/office/drawing/2014/main" id="{3DBE506A-94AE-C268-3156-5A3B8F867F99}"/>
+                <a16:creationId xmlns="" xmlns:a16="http://schemas.microsoft.com/office/drawing/2014/main" id="{3DBE506A-94AE-C268-3156-5A3B8F867F99}"/>
               </a:ext>
             </a:extLst>
           </p:cNvPr>
@@ -11016,7 +11101,7 @@
           <p:cNvPr id="7" name="TextBox 6">
             <a:extLst>
               <a:ext uri="{FF2B5EF4-FFF2-40B4-BE49-F238E27FC236}">
-                <a16:creationId xmlns:a16="http://schemas.microsoft.com/office/drawing/2014/main" id="{EC22761B-80B8-2156-C448-780E921DCFEE}"/>
+                <a16:creationId xmlns="" xmlns:a16="http://schemas.microsoft.com/office/drawing/2014/main" id="{EC22761B-80B8-2156-C448-780E921DCFEE}"/>
               </a:ext>
             </a:extLst>
           </p:cNvPr>
@@ -11133,7 +11218,7 @@
           <p:cNvPr id="8" name="Picture 7">
             <a:extLst>
               <a:ext uri="{FF2B5EF4-FFF2-40B4-BE49-F238E27FC236}">
-                <a16:creationId xmlns:a16="http://schemas.microsoft.com/office/drawing/2014/main" id="{1E26BDB8-A578-38DB-FDEF-453F241AEBE1}"/>
+                <a16:creationId xmlns="" xmlns:a16="http://schemas.microsoft.com/office/drawing/2014/main" id="{1E26BDB8-A578-38DB-FDEF-453F241AEBE1}"/>
               </a:ext>
             </a:extLst>
           </p:cNvPr>
@@ -11163,7 +11248,7 @@
           <p:cNvPr id="10" name="Picture 9">
             <a:extLst>
               <a:ext uri="{FF2B5EF4-FFF2-40B4-BE49-F238E27FC236}">
-                <a16:creationId xmlns:a16="http://schemas.microsoft.com/office/drawing/2014/main" id="{1CAFA705-1F8D-7111-83BD-A270C1FCF533}"/>
+                <a16:creationId xmlns="" xmlns:a16="http://schemas.microsoft.com/office/drawing/2014/main" id="{1CAFA705-1F8D-7111-83BD-A270C1FCF533}"/>
               </a:ext>
             </a:extLst>
           </p:cNvPr>
@@ -11271,7 +11356,7 @@
           <p:cNvPr id="4" name="Picture 3">
             <a:extLst>
               <a:ext uri="{FF2B5EF4-FFF2-40B4-BE49-F238E27FC236}">
-                <a16:creationId xmlns:a16="http://schemas.microsoft.com/office/drawing/2014/main" id="{905C41C8-D0A6-5DA9-56FC-6301C841F1FE}"/>
+                <a16:creationId xmlns="" xmlns:a16="http://schemas.microsoft.com/office/drawing/2014/main" id="{905C41C8-D0A6-5DA9-56FC-6301C841F1FE}"/>
               </a:ext>
             </a:extLst>
           </p:cNvPr>
@@ -11301,7 +11386,7 @@
           <p:cNvPr id="6" name="Picture 5">
             <a:extLst>
               <a:ext uri="{FF2B5EF4-FFF2-40B4-BE49-F238E27FC236}">
-                <a16:creationId xmlns:a16="http://schemas.microsoft.com/office/drawing/2014/main" id="{4639EF87-777D-A9B4-7740-BEB565F2FF80}"/>
+                <a16:creationId xmlns="" xmlns:a16="http://schemas.microsoft.com/office/drawing/2014/main" id="{4639EF87-777D-A9B4-7740-BEB565F2FF80}"/>
               </a:ext>
             </a:extLst>
           </p:cNvPr>
@@ -11409,7 +11494,7 @@
           <p:cNvPr id="4" name="Picture 3">
             <a:extLst>
               <a:ext uri="{FF2B5EF4-FFF2-40B4-BE49-F238E27FC236}">
-                <a16:creationId xmlns:a16="http://schemas.microsoft.com/office/drawing/2014/main" id="{41937AAE-ED1D-97B1-956C-52F3280CBB74}"/>
+                <a16:creationId xmlns="" xmlns:a16="http://schemas.microsoft.com/office/drawing/2014/main" id="{41937AAE-ED1D-97B1-956C-52F3280CBB74}"/>
               </a:ext>
             </a:extLst>
           </p:cNvPr>
@@ -11445,7 +11530,7 @@
           <p:cNvPr id="5" name="TextBox 4">
             <a:extLst>
               <a:ext uri="{FF2B5EF4-FFF2-40B4-BE49-F238E27FC236}">
-                <a16:creationId xmlns:a16="http://schemas.microsoft.com/office/drawing/2014/main" id="{4C95C56A-D984-5F7B-09AE-27F0B4CF4E99}"/>
+                <a16:creationId xmlns="" xmlns:a16="http://schemas.microsoft.com/office/drawing/2014/main" id="{4C95C56A-D984-5F7B-09AE-27F0B4CF4E99}"/>
               </a:ext>
             </a:extLst>
           </p:cNvPr>
@@ -11804,7 +11889,7 @@
           <p:cNvPr id="6" name="Picture 5">
             <a:extLst>
               <a:ext uri="{FF2B5EF4-FFF2-40B4-BE49-F238E27FC236}">
-                <a16:creationId xmlns:a16="http://schemas.microsoft.com/office/drawing/2014/main" id="{618A09A0-9AA3-412C-3A36-AE296A89CB10}"/>
+                <a16:creationId xmlns="" xmlns:a16="http://schemas.microsoft.com/office/drawing/2014/main" id="{618A09A0-9AA3-412C-3A36-AE296A89CB10}"/>
               </a:ext>
             </a:extLst>
           </p:cNvPr>
@@ -12109,7 +12194,7 @@
           <p:cNvPr id="4" name="Picture 3">
             <a:extLst>
               <a:ext uri="{FF2B5EF4-FFF2-40B4-BE49-F238E27FC236}">
-                <a16:creationId xmlns:a16="http://schemas.microsoft.com/office/drawing/2014/main" id="{3FDB99FC-7775-152A-2532-558FCE4A761A}"/>
+                <a16:creationId xmlns="" xmlns:a16="http://schemas.microsoft.com/office/drawing/2014/main" id="{3FDB99FC-7775-152A-2532-558FCE4A761A}"/>
               </a:ext>
             </a:extLst>
           </p:cNvPr>
@@ -12223,7 +12308,7 @@
           <p:cNvPr id="5" name="Picture 4">
             <a:extLst>
               <a:ext uri="{FF2B5EF4-FFF2-40B4-BE49-F238E27FC236}">
-                <a16:creationId xmlns:a16="http://schemas.microsoft.com/office/drawing/2014/main" id="{770662F7-9D96-D8B8-A127-5CF4E1FCB2E3}"/>
+                <a16:creationId xmlns="" xmlns:a16="http://schemas.microsoft.com/office/drawing/2014/main" id="{770662F7-9D96-D8B8-A127-5CF4E1FCB2E3}"/>
               </a:ext>
             </a:extLst>
           </p:cNvPr>
@@ -12259,7 +12344,7 @@
           <p:cNvPr id="8" name="TextBox 7">
             <a:extLst>
               <a:ext uri="{FF2B5EF4-FFF2-40B4-BE49-F238E27FC236}">
-                <a16:creationId xmlns:a16="http://schemas.microsoft.com/office/drawing/2014/main" id="{85280BAB-4788-5FCA-5012-F8415570676E}"/>
+                <a16:creationId xmlns="" xmlns:a16="http://schemas.microsoft.com/office/drawing/2014/main" id="{85280BAB-4788-5FCA-5012-F8415570676E}"/>
               </a:ext>
             </a:extLst>
           </p:cNvPr>
@@ -12776,7 +12861,7 @@
           <p:cNvPr id="8" name="TextBox 7">
             <a:extLst>
               <a:ext uri="{FF2B5EF4-FFF2-40B4-BE49-F238E27FC236}">
-                <a16:creationId xmlns:a16="http://schemas.microsoft.com/office/drawing/2014/main" id="{85280BAB-4788-5FCA-5012-F8415570676E}"/>
+                <a16:creationId xmlns="" xmlns:a16="http://schemas.microsoft.com/office/drawing/2014/main" id="{85280BAB-4788-5FCA-5012-F8415570676E}"/>
               </a:ext>
             </a:extLst>
           </p:cNvPr>
@@ -12880,7 +12965,7 @@
           <p:cNvPr id="7" name="Picture 6">
             <a:extLst>
               <a:ext uri="{FF2B5EF4-FFF2-40B4-BE49-F238E27FC236}">
-                <a16:creationId xmlns:a16="http://schemas.microsoft.com/office/drawing/2014/main" id="{F5420F95-591C-6211-8269-36C47FECC2CF}"/>
+                <a16:creationId xmlns="" xmlns:a16="http://schemas.microsoft.com/office/drawing/2014/main" id="{F5420F95-591C-6211-8269-36C47FECC2CF}"/>
               </a:ext>
             </a:extLst>
           </p:cNvPr>
@@ -13329,7 +13414,7 @@
           <p:cNvPr id="4" name="Picture 3">
             <a:extLst>
               <a:ext uri="{FF2B5EF4-FFF2-40B4-BE49-F238E27FC236}">
-                <a16:creationId xmlns:a16="http://schemas.microsoft.com/office/drawing/2014/main" id="{84666911-E526-542B-1294-6AC7FC76C70F}"/>
+                <a16:creationId xmlns="" xmlns:a16="http://schemas.microsoft.com/office/drawing/2014/main" id="{84666911-E526-542B-1294-6AC7FC76C70F}"/>
               </a:ext>
             </a:extLst>
           </p:cNvPr>
@@ -13443,7 +13528,7 @@
           <p:cNvPr id="5" name="Picture 4">
             <a:extLst>
               <a:ext uri="{FF2B5EF4-FFF2-40B4-BE49-F238E27FC236}">
-                <a16:creationId xmlns:a16="http://schemas.microsoft.com/office/drawing/2014/main" id="{05D779F2-ECDC-B17A-D7D3-19CF556738FF}"/>
+                <a16:creationId xmlns="" xmlns:a16="http://schemas.microsoft.com/office/drawing/2014/main" id="{05D779F2-ECDC-B17A-D7D3-19CF556738FF}"/>
               </a:ext>
             </a:extLst>
           </p:cNvPr>
@@ -13479,7 +13564,7 @@
           <p:cNvPr id="7" name="Picture 6">
             <a:extLst>
               <a:ext uri="{FF2B5EF4-FFF2-40B4-BE49-F238E27FC236}">
-                <a16:creationId xmlns:a16="http://schemas.microsoft.com/office/drawing/2014/main" id="{FF7D91B3-017D-6603-AF9F-9871AC43A9E9}"/>
+                <a16:creationId xmlns="" xmlns:a16="http://schemas.microsoft.com/office/drawing/2014/main" id="{FF7D91B3-017D-6603-AF9F-9871AC43A9E9}"/>
               </a:ext>
             </a:extLst>
           </p:cNvPr>
@@ -13593,7 +13678,7 @@
           <p:cNvPr id="4" name="Picture 3">
             <a:extLst>
               <a:ext uri="{FF2B5EF4-FFF2-40B4-BE49-F238E27FC236}">
-                <a16:creationId xmlns:a16="http://schemas.microsoft.com/office/drawing/2014/main" id="{1516477E-148A-EE26-D515-B9BA1710E7F9}"/>
+                <a16:creationId xmlns="" xmlns:a16="http://schemas.microsoft.com/office/drawing/2014/main" id="{1516477E-148A-EE26-D515-B9BA1710E7F9}"/>
               </a:ext>
             </a:extLst>
           </p:cNvPr>
@@ -13707,7 +13792,7 @@
           <p:cNvPr id="5" name="Picture 4">
             <a:extLst>
               <a:ext uri="{FF2B5EF4-FFF2-40B4-BE49-F238E27FC236}">
-                <a16:creationId xmlns:a16="http://schemas.microsoft.com/office/drawing/2014/main" id="{A6AD9895-2B9C-AAE2-BB3E-1A40E3614484}"/>
+                <a16:creationId xmlns="" xmlns:a16="http://schemas.microsoft.com/office/drawing/2014/main" id="{A6AD9895-2B9C-AAE2-BB3E-1A40E3614484}"/>
               </a:ext>
             </a:extLst>
           </p:cNvPr>
@@ -13821,7 +13906,7 @@
           <p:cNvPr id="4" name="Picture 3">
             <a:extLst>
               <a:ext uri="{FF2B5EF4-FFF2-40B4-BE49-F238E27FC236}">
-                <a16:creationId xmlns:a16="http://schemas.microsoft.com/office/drawing/2014/main" id="{08B9380D-623A-8501-15AA-8CF1496C211F}"/>
+                <a16:creationId xmlns="" xmlns:a16="http://schemas.microsoft.com/office/drawing/2014/main" id="{08B9380D-623A-8501-15AA-8CF1496C211F}"/>
               </a:ext>
             </a:extLst>
           </p:cNvPr>
@@ -13935,7 +14020,7 @@
           <p:cNvPr id="5" name="Picture 4">
             <a:extLst>
               <a:ext uri="{FF2B5EF4-FFF2-40B4-BE49-F238E27FC236}">
-                <a16:creationId xmlns:a16="http://schemas.microsoft.com/office/drawing/2014/main" id="{9E65409B-925D-39D7-8A28-CD9680904EE5}"/>
+                <a16:creationId xmlns="" xmlns:a16="http://schemas.microsoft.com/office/drawing/2014/main" id="{9E65409B-925D-39D7-8A28-CD9680904EE5}"/>
               </a:ext>
             </a:extLst>
           </p:cNvPr>
@@ -13970,6 +14055,171 @@
     <p:extLst>
       <p:ext uri="{BB962C8B-B14F-4D97-AF65-F5344CB8AC3E}">
         <p14:creationId xmlns:p14="http://schemas.microsoft.com/office/powerpoint/2010/main" val="3939365581"/>
+      </p:ext>
+    </p:extLst>
+  </p:cSld>
+  <p:clrMapOvr>
+    <a:masterClrMapping/>
+  </p:clrMapOvr>
+</p:sld>
+</file>
+
+<file path=ppt/slides/slide39.xml><?xml version="1.0" encoding="utf-8"?>
+<p:sld xmlns:a="http://schemas.openxmlformats.org/drawingml/2006/main" xmlns:r="http://schemas.openxmlformats.org/officeDocument/2006/relationships" xmlns:p="http://schemas.openxmlformats.org/presentationml/2006/main">
+  <p:cSld>
+    <p:bg>
+      <p:bgPr>
+        <a:blipFill dpi="0" rotWithShape="1">
+          <a:blip r:embed="rId3">
+            <a:lum/>
+          </a:blip>
+          <a:srcRect/>
+          <a:stretch>
+            <a:fillRect l="-1000" r="-1000"/>
+          </a:stretch>
+        </a:blipFill>
+        <a:effectLst/>
+      </p:bgPr>
+    </p:bg>
+    <p:spTree>
+      <p:nvGrpSpPr>
+        <p:cNvPr id="1" name=""/>
+        <p:cNvGrpSpPr/>
+        <p:nvPr/>
+      </p:nvGrpSpPr>
+      <p:grpSpPr>
+        <a:xfrm>
+          <a:off x="0" y="0"/>
+          <a:ext cx="0" cy="0"/>
+          <a:chOff x="0" y="0"/>
+          <a:chExt cx="0" cy="0"/>
+        </a:xfrm>
+      </p:grpSpPr>
+      <p:sp>
+        <p:nvSpPr>
+          <p:cNvPr id="3" name="Rectangle 2"/>
+          <p:cNvSpPr/>
+          <p:nvPr/>
+        </p:nvSpPr>
+        <p:spPr>
+          <a:xfrm>
+            <a:off x="685800" y="133350"/>
+            <a:ext cx="3501280" cy="307777"/>
+          </a:xfrm>
+          <a:prstGeom prst="rect">
+            <a:avLst/>
+          </a:prstGeom>
+        </p:spPr>
+        <p:txBody>
+          <a:bodyPr wrap="none">
+            <a:spAutoFit/>
+          </a:bodyPr>
+          <a:lstStyle/>
+          <a:p>
+            <a:r>
+              <a:rPr lang="en-US" sz="1400" b="1" dirty="0" smtClean="0">
+                <a:solidFill>
+                  <a:srgbClr val="0070C0"/>
+                </a:solidFill>
+                <a:latin typeface="Roboto" panose="02000000000000000000" pitchFamily="2" charset="0"/>
+                <a:ea typeface="Roboto" panose="02000000000000000000" pitchFamily="2" charset="0"/>
+              </a:rPr>
+              <a:t>Flutter Blog List (My First Flutter Project)</a:t>
+            </a:r>
+            <a:endParaRPr lang="en-US" sz="1400" b="1" dirty="0">
+              <a:solidFill>
+                <a:srgbClr val="0070C0"/>
+              </a:solidFill>
+              <a:latin typeface="Roboto" panose="02000000000000000000" pitchFamily="2" charset="0"/>
+              <a:ea typeface="Roboto" panose="02000000000000000000" pitchFamily="2" charset="0"/>
+            </a:endParaRPr>
+          </a:p>
+        </p:txBody>
+      </p:sp>
+      <p:pic>
+        <p:nvPicPr>
+          <p:cNvPr id="2" name="Picture 1"/>
+          <p:cNvPicPr>
+            <a:picLocks noChangeAspect="1"/>
+          </p:cNvPicPr>
+          <p:nvPr/>
+        </p:nvPicPr>
+        <p:blipFill>
+          <a:blip r:embed="rId4" cstate="print">
+            <a:extLst>
+              <a:ext uri="{28A0092B-C50C-407E-A947-70E740481C1C}">
+                <a14:useLocalDpi xmlns:a14="http://schemas.microsoft.com/office/drawing/2010/main" val="0"/>
+              </a:ext>
+            </a:extLst>
+          </a:blip>
+          <a:stretch>
+            <a:fillRect/>
+          </a:stretch>
+        </p:blipFill>
+        <p:spPr>
+          <a:xfrm>
+            <a:off x="2514600" y="782747"/>
+            <a:ext cx="1828800" cy="3924974"/>
+          </a:xfrm>
+          <a:prstGeom prst="rect">
+            <a:avLst/>
+          </a:prstGeom>
+          <a:ln>
+            <a:noFill/>
+          </a:ln>
+          <a:effectLst>
+            <a:outerShdw blurRad="292100" dist="139700" dir="2700000" algn="tl" rotWithShape="0">
+              <a:srgbClr val="333333">
+                <a:alpha val="65000"/>
+              </a:srgbClr>
+            </a:outerShdw>
+          </a:effectLst>
+        </p:spPr>
+      </p:pic>
+      <p:pic>
+        <p:nvPicPr>
+          <p:cNvPr id="4" name="Picture 3"/>
+          <p:cNvPicPr>
+            <a:picLocks noChangeAspect="1"/>
+          </p:cNvPicPr>
+          <p:nvPr/>
+        </p:nvPicPr>
+        <p:blipFill>
+          <a:blip r:embed="rId5" cstate="print">
+            <a:extLst>
+              <a:ext uri="{28A0092B-C50C-407E-A947-70E740481C1C}">
+                <a14:useLocalDpi xmlns:a14="http://schemas.microsoft.com/office/drawing/2010/main" val="0"/>
+              </a:ext>
+            </a:extLst>
+          </a:blip>
+          <a:stretch>
+            <a:fillRect/>
+          </a:stretch>
+        </p:blipFill>
+        <p:spPr>
+          <a:xfrm>
+            <a:off x="304800" y="769140"/>
+            <a:ext cx="1772361" cy="3938581"/>
+          </a:xfrm>
+          <a:prstGeom prst="rect">
+            <a:avLst/>
+          </a:prstGeom>
+          <a:ln>
+            <a:noFill/>
+          </a:ln>
+          <a:effectLst>
+            <a:outerShdw blurRad="292100" dist="139700" dir="2700000" algn="tl" rotWithShape="0">
+              <a:srgbClr val="333333">
+                <a:alpha val="65000"/>
+              </a:srgbClr>
+            </a:outerShdw>
+          </a:effectLst>
+        </p:spPr>
+      </p:pic>
+    </p:spTree>
+    <p:extLst>
+      <p:ext uri="{BB962C8B-B14F-4D97-AF65-F5344CB8AC3E}">
+        <p14:creationId xmlns:p14="http://schemas.microsoft.com/office/powerpoint/2010/main" val="1786488463"/>
       </p:ext>
     </p:extLst>
   </p:cSld>
@@ -14345,7 +14595,7 @@
           <p:cNvPr id="4" name="Picture 3">
             <a:extLst>
               <a:ext uri="{FF2B5EF4-FFF2-40B4-BE49-F238E27FC236}">
-                <a16:creationId xmlns:a16="http://schemas.microsoft.com/office/drawing/2014/main" id="{3A60D467-9335-D260-C03A-BE9A10801B85}"/>
+                <a16:creationId xmlns="" xmlns:a16="http://schemas.microsoft.com/office/drawing/2014/main" id="{3A60D467-9335-D260-C03A-BE9A10801B85}"/>
               </a:ext>
             </a:extLst>
           </p:cNvPr>
@@ -14375,7 +14625,7 @@
           <p:cNvPr id="7" name="Picture 6">
             <a:extLst>
               <a:ext uri="{FF2B5EF4-FFF2-40B4-BE49-F238E27FC236}">
-                <a16:creationId xmlns:a16="http://schemas.microsoft.com/office/drawing/2014/main" id="{67D9C20A-4DA7-2386-01C3-0BBABFBA31C4}"/>
+                <a16:creationId xmlns="" xmlns:a16="http://schemas.microsoft.com/office/drawing/2014/main" id="{67D9C20A-4DA7-2386-01C3-0BBABFBA31C4}"/>
               </a:ext>
             </a:extLst>
           </p:cNvPr>
@@ -14618,7 +14868,7 @@
           <p:cNvPr id="5" name="Picture 4">
             <a:extLst>
               <a:ext uri="{FF2B5EF4-FFF2-40B4-BE49-F238E27FC236}">
-                <a16:creationId xmlns:a16="http://schemas.microsoft.com/office/drawing/2014/main" id="{653C8343-D5F6-5904-F4D0-B742B97D78A8}"/>
+                <a16:creationId xmlns="" xmlns:a16="http://schemas.microsoft.com/office/drawing/2014/main" id="{653C8343-D5F6-5904-F4D0-B742B97D78A8}"/>
               </a:ext>
             </a:extLst>
           </p:cNvPr>
@@ -14809,7 +15059,7 @@
           <p:cNvPr id="4" name="Picture 3">
             <a:extLst>
               <a:ext uri="{FF2B5EF4-FFF2-40B4-BE49-F238E27FC236}">
-                <a16:creationId xmlns:a16="http://schemas.microsoft.com/office/drawing/2014/main" id="{F717AD2B-8CBD-D15F-2B82-C04AB4107C06}"/>
+                <a16:creationId xmlns="" xmlns:a16="http://schemas.microsoft.com/office/drawing/2014/main" id="{F717AD2B-8CBD-D15F-2B82-C04AB4107C06}"/>
               </a:ext>
             </a:extLst>
           </p:cNvPr>
@@ -14839,7 +15089,7 @@
           <p:cNvPr id="7" name="TextBox 6">
             <a:extLst>
               <a:ext uri="{FF2B5EF4-FFF2-40B4-BE49-F238E27FC236}">
-                <a16:creationId xmlns:a16="http://schemas.microsoft.com/office/drawing/2014/main" id="{D5175723-71CB-419F-22D4-E782F927EABB}"/>
+                <a16:creationId xmlns="" xmlns:a16="http://schemas.microsoft.com/office/drawing/2014/main" id="{D5175723-71CB-419F-22D4-E782F927EABB}"/>
               </a:ext>
             </a:extLst>
           </p:cNvPr>
@@ -14952,7 +15202,7 @@
           <p:cNvPr id="8" name="TextBox 7">
             <a:extLst>
               <a:ext uri="{FF2B5EF4-FFF2-40B4-BE49-F238E27FC236}">
-                <a16:creationId xmlns:a16="http://schemas.microsoft.com/office/drawing/2014/main" id="{4F22F4DE-524C-33BC-37B4-FD21A97F55E8}"/>
+                <a16:creationId xmlns="" xmlns:a16="http://schemas.microsoft.com/office/drawing/2014/main" id="{4F22F4DE-524C-33BC-37B4-FD21A97F55E8}"/>
               </a:ext>
             </a:extLst>
           </p:cNvPr>
@@ -15848,7 +16098,7 @@
           <p:cNvPr id="4" name="Picture 3">
             <a:extLst>
               <a:ext uri="{FF2B5EF4-FFF2-40B4-BE49-F238E27FC236}">
-                <a16:creationId xmlns:a16="http://schemas.microsoft.com/office/drawing/2014/main" id="{F717AD2B-8CBD-D15F-2B82-C04AB4107C06}"/>
+                <a16:creationId xmlns="" xmlns:a16="http://schemas.microsoft.com/office/drawing/2014/main" id="{F717AD2B-8CBD-D15F-2B82-C04AB4107C06}"/>
               </a:ext>
             </a:extLst>
           </p:cNvPr>
@@ -15878,7 +16128,7 @@
           <p:cNvPr id="7" name="TextBox 6">
             <a:extLst>
               <a:ext uri="{FF2B5EF4-FFF2-40B4-BE49-F238E27FC236}">
-                <a16:creationId xmlns:a16="http://schemas.microsoft.com/office/drawing/2014/main" id="{D5175723-71CB-419F-22D4-E782F927EABB}"/>
+                <a16:creationId xmlns="" xmlns:a16="http://schemas.microsoft.com/office/drawing/2014/main" id="{D5175723-71CB-419F-22D4-E782F927EABB}"/>
               </a:ext>
             </a:extLst>
           </p:cNvPr>
@@ -16568,7 +16818,7 @@
           <p:cNvPr id="4" name="Picture 3">
             <a:extLst>
               <a:ext uri="{FF2B5EF4-FFF2-40B4-BE49-F238E27FC236}">
-                <a16:creationId xmlns:a16="http://schemas.microsoft.com/office/drawing/2014/main" id="{F717AD2B-8CBD-D15F-2B82-C04AB4107C06}"/>
+                <a16:creationId xmlns="" xmlns:a16="http://schemas.microsoft.com/office/drawing/2014/main" id="{F717AD2B-8CBD-D15F-2B82-C04AB4107C06}"/>
               </a:ext>
             </a:extLst>
           </p:cNvPr>
@@ -16598,7 +16848,7 @@
           <p:cNvPr id="7" name="TextBox 6">
             <a:extLst>
               <a:ext uri="{FF2B5EF4-FFF2-40B4-BE49-F238E27FC236}">
-                <a16:creationId xmlns:a16="http://schemas.microsoft.com/office/drawing/2014/main" id="{D5175723-71CB-419F-22D4-E782F927EABB}"/>
+                <a16:creationId xmlns="" xmlns:a16="http://schemas.microsoft.com/office/drawing/2014/main" id="{D5175723-71CB-419F-22D4-E782F927EABB}"/>
               </a:ext>
             </a:extLst>
           </p:cNvPr>

</xml_diff>

<commit_message>
Simple Counter App Update
</commit_message>
<xml_diff>
--- a/Flutter/PPT/Slide.pptx
+++ b/Flutter/PPT/Slide.pptx
@@ -272,7 +272,7 @@
           <a:p>
             <a:fld id="{38EBF754-CDC4-4762-B81C-FDFA88BC1D35}" type="datetimeFigureOut">
               <a:rPr lang="en-US" smtClean="0"/>
-              <a:t>Tue</a:t>
+              <a:t>Sat</a:t>
             </a:fld>
             <a:endParaRPr lang="en-US"/>
           </a:p>
@@ -3995,7 +3995,7 @@
             <a:fld id="{1D8BD707-D9CF-40AE-B4C6-C98DA3205C09}" type="datetimeFigureOut">
               <a:rPr lang="en-US" smtClean="0"/>
               <a:pPr/>
-              <a:t>Tue</a:t>
+              <a:t>Sat</a:t>
             </a:fld>
             <a:endParaRPr lang="en-US"/>
           </a:p>
@@ -4160,7 +4160,7 @@
             <a:fld id="{1D8BD707-D9CF-40AE-B4C6-C98DA3205C09}" type="datetimeFigureOut">
               <a:rPr lang="en-US" smtClean="0"/>
               <a:pPr/>
-              <a:t>Tue</a:t>
+              <a:t>Sat</a:t>
             </a:fld>
             <a:endParaRPr lang="en-US"/>
           </a:p>
@@ -4335,7 +4335,7 @@
             <a:fld id="{1D8BD707-D9CF-40AE-B4C6-C98DA3205C09}" type="datetimeFigureOut">
               <a:rPr lang="en-US" smtClean="0"/>
               <a:pPr/>
-              <a:t>Tue</a:t>
+              <a:t>Sat</a:t>
             </a:fld>
             <a:endParaRPr lang="en-US"/>
           </a:p>
@@ -4500,7 +4500,7 @@
             <a:fld id="{1D8BD707-D9CF-40AE-B4C6-C98DA3205C09}" type="datetimeFigureOut">
               <a:rPr lang="en-US" smtClean="0"/>
               <a:pPr/>
-              <a:t>Tue</a:t>
+              <a:t>Sat</a:t>
             </a:fld>
             <a:endParaRPr lang="en-US"/>
           </a:p>
@@ -4742,7 +4742,7 @@
             <a:fld id="{1D8BD707-D9CF-40AE-B4C6-C98DA3205C09}" type="datetimeFigureOut">
               <a:rPr lang="en-US" smtClean="0"/>
               <a:pPr/>
-              <a:t>Tue</a:t>
+              <a:t>Sat</a:t>
             </a:fld>
             <a:endParaRPr lang="en-US"/>
           </a:p>
@@ -5024,7 +5024,7 @@
             <a:fld id="{1D8BD707-D9CF-40AE-B4C6-C98DA3205C09}" type="datetimeFigureOut">
               <a:rPr lang="en-US" smtClean="0"/>
               <a:pPr/>
-              <a:t>Tue</a:t>
+              <a:t>Sat</a:t>
             </a:fld>
             <a:endParaRPr lang="en-US"/>
           </a:p>
@@ -5440,7 +5440,7 @@
             <a:fld id="{1D8BD707-D9CF-40AE-B4C6-C98DA3205C09}" type="datetimeFigureOut">
               <a:rPr lang="en-US" smtClean="0"/>
               <a:pPr/>
-              <a:t>Tue</a:t>
+              <a:t>Sat</a:t>
             </a:fld>
             <a:endParaRPr lang="en-US"/>
           </a:p>
@@ -5554,7 +5554,7 @@
             <a:fld id="{1D8BD707-D9CF-40AE-B4C6-C98DA3205C09}" type="datetimeFigureOut">
               <a:rPr lang="en-US" smtClean="0"/>
               <a:pPr/>
-              <a:t>Tue</a:t>
+              <a:t>Sat</a:t>
             </a:fld>
             <a:endParaRPr lang="en-US"/>
           </a:p>
@@ -5646,7 +5646,7 @@
             <a:fld id="{1D8BD707-D9CF-40AE-B4C6-C98DA3205C09}" type="datetimeFigureOut">
               <a:rPr lang="en-US" smtClean="0"/>
               <a:pPr/>
-              <a:t>Tue</a:t>
+              <a:t>Sat</a:t>
             </a:fld>
             <a:endParaRPr lang="en-US"/>
           </a:p>
@@ -5918,7 +5918,7 @@
             <a:fld id="{1D8BD707-D9CF-40AE-B4C6-C98DA3205C09}" type="datetimeFigureOut">
               <a:rPr lang="en-US" smtClean="0"/>
               <a:pPr/>
-              <a:t>Tue</a:t>
+              <a:t>Sat</a:t>
             </a:fld>
             <a:endParaRPr lang="en-US"/>
           </a:p>
@@ -6167,7 +6167,7 @@
             <a:fld id="{1D8BD707-D9CF-40AE-B4C6-C98DA3205C09}" type="datetimeFigureOut">
               <a:rPr lang="en-US" smtClean="0"/>
               <a:pPr/>
-              <a:t>Tue</a:t>
+              <a:t>Sat</a:t>
             </a:fld>
             <a:endParaRPr lang="en-US"/>
           </a:p>
@@ -6384,7 +6384,7 @@
             <a:fld id="{1D8BD707-D9CF-40AE-B4C6-C98DA3205C09}" type="datetimeFigureOut">
               <a:rPr lang="en-US" smtClean="0"/>
               <a:pPr/>
-              <a:t>Tue</a:t>
+              <a:t>Sat</a:t>
             </a:fld>
             <a:endParaRPr lang="en-US"/>
           </a:p>

</xml_diff>